<commit_message>
swapped order of slides 5-6
</commit_message>
<xml_diff>
--- a/cs447_rec2_may23.pptx
+++ b/cs447_rec2_may23.pptx
@@ -12,8 +12,8 @@
     <p:sldId id="259" r:id="rId3"/>
     <p:sldId id="281" r:id="rId4"/>
     <p:sldId id="282" r:id="rId5"/>
-    <p:sldId id="283" r:id="rId6"/>
-    <p:sldId id="295" r:id="rId7"/>
+    <p:sldId id="295" r:id="rId6"/>
+    <p:sldId id="283" r:id="rId7"/>
     <p:sldId id="284" r:id="rId8"/>
     <p:sldId id="296" r:id="rId9"/>
     <p:sldId id="285" r:id="rId10"/>
@@ -238,7 +238,7 @@
           <a:p>
             <a:fld id="{79DACF82-7282-4538-9925-81D795D18BF0}" type="datetimeFigureOut">
               <a:rPr lang="en-US" smtClean="0"/>
-              <a:t>5/22/2018</a:t>
+              <a:t>5/23/2018</a:t>
             </a:fld>
             <a:endParaRPr lang="en-US"/>
           </a:p>
@@ -636,7 +636,7 @@
           <a:p>
             <a:fld id="{7880F47B-3C72-48E5-9CD2-8B9AE0E9AFF7}" type="datetimeFigureOut">
               <a:rPr lang="en-US" smtClean="0"/>
-              <a:t>5/22/2018</a:t>
+              <a:t>5/23/2018</a:t>
             </a:fld>
             <a:endParaRPr lang="en-US"/>
           </a:p>
@@ -806,7 +806,7 @@
           <a:p>
             <a:fld id="{7880F47B-3C72-48E5-9CD2-8B9AE0E9AFF7}" type="datetimeFigureOut">
               <a:rPr lang="en-US" smtClean="0"/>
-              <a:t>5/22/2018</a:t>
+              <a:t>5/23/2018</a:t>
             </a:fld>
             <a:endParaRPr lang="en-US"/>
           </a:p>
@@ -986,7 +986,7 @@
           <a:p>
             <a:fld id="{7880F47B-3C72-48E5-9CD2-8B9AE0E9AFF7}" type="datetimeFigureOut">
               <a:rPr lang="en-US" smtClean="0"/>
-              <a:t>5/22/2018</a:t>
+              <a:t>5/23/2018</a:t>
             </a:fld>
             <a:endParaRPr lang="en-US"/>
           </a:p>
@@ -1156,7 +1156,7 @@
           <a:p>
             <a:fld id="{7880F47B-3C72-48E5-9CD2-8B9AE0E9AFF7}" type="datetimeFigureOut">
               <a:rPr lang="en-US" smtClean="0"/>
-              <a:t>5/22/2018</a:t>
+              <a:t>5/23/2018</a:t>
             </a:fld>
             <a:endParaRPr lang="en-US"/>
           </a:p>
@@ -1400,7 +1400,7 @@
           <a:p>
             <a:fld id="{7880F47B-3C72-48E5-9CD2-8B9AE0E9AFF7}" type="datetimeFigureOut">
               <a:rPr lang="en-US" smtClean="0"/>
-              <a:t>5/22/2018</a:t>
+              <a:t>5/23/2018</a:t>
             </a:fld>
             <a:endParaRPr lang="en-US"/>
           </a:p>
@@ -1632,7 +1632,7 @@
           <a:p>
             <a:fld id="{7880F47B-3C72-48E5-9CD2-8B9AE0E9AFF7}" type="datetimeFigureOut">
               <a:rPr lang="en-US" smtClean="0"/>
-              <a:t>5/22/2018</a:t>
+              <a:t>5/23/2018</a:t>
             </a:fld>
             <a:endParaRPr lang="en-US"/>
           </a:p>
@@ -1999,7 +1999,7 @@
           <a:p>
             <a:fld id="{7880F47B-3C72-48E5-9CD2-8B9AE0E9AFF7}" type="datetimeFigureOut">
               <a:rPr lang="en-US" smtClean="0"/>
-              <a:t>5/22/2018</a:t>
+              <a:t>5/23/2018</a:t>
             </a:fld>
             <a:endParaRPr lang="en-US"/>
           </a:p>
@@ -2117,7 +2117,7 @@
           <a:p>
             <a:fld id="{7880F47B-3C72-48E5-9CD2-8B9AE0E9AFF7}" type="datetimeFigureOut">
               <a:rPr lang="en-US" smtClean="0"/>
-              <a:t>5/22/2018</a:t>
+              <a:t>5/23/2018</a:t>
             </a:fld>
             <a:endParaRPr lang="en-US"/>
           </a:p>
@@ -2212,7 +2212,7 @@
           <a:p>
             <a:fld id="{7880F47B-3C72-48E5-9CD2-8B9AE0E9AFF7}" type="datetimeFigureOut">
               <a:rPr lang="en-US" smtClean="0"/>
-              <a:t>5/22/2018</a:t>
+              <a:t>5/23/2018</a:t>
             </a:fld>
             <a:endParaRPr lang="en-US"/>
           </a:p>
@@ -2489,7 +2489,7 @@
           <a:p>
             <a:fld id="{7880F47B-3C72-48E5-9CD2-8B9AE0E9AFF7}" type="datetimeFigureOut">
               <a:rPr lang="en-US" smtClean="0"/>
-              <a:t>5/22/2018</a:t>
+              <a:t>5/23/2018</a:t>
             </a:fld>
             <a:endParaRPr lang="en-US"/>
           </a:p>
@@ -2746,7 +2746,7 @@
           <a:p>
             <a:fld id="{7880F47B-3C72-48E5-9CD2-8B9AE0E9AFF7}" type="datetimeFigureOut">
               <a:rPr lang="en-US" smtClean="0"/>
-              <a:t>5/22/2018</a:t>
+              <a:t>5/23/2018</a:t>
             </a:fld>
             <a:endParaRPr lang="en-US"/>
           </a:p>
@@ -2959,7 +2959,7 @@
           <a:p>
             <a:fld id="{7880F47B-3C72-48E5-9CD2-8B9AE0E9AFF7}" type="datetimeFigureOut">
               <a:rPr lang="en-US" smtClean="0"/>
-              <a:t>5/22/2018</a:t>
+              <a:t>5/23/2018</a:t>
             </a:fld>
             <a:endParaRPr lang="en-US"/>
           </a:p>
@@ -6988,495 +6988,6 @@
                   <a:srgbClr val="002060"/>
                 </a:solidFill>
               </a:rPr>
-              <a:t>Syscall</a:t>
-            </a:r>
-            <a:r>
-              <a:rPr lang="en-US" sz="2800" dirty="0">
-                <a:solidFill>
-                  <a:srgbClr val="002060"/>
-                </a:solidFill>
-              </a:rPr>
-              <a:t> #4 (print string)</a:t>
-            </a:r>
-          </a:p>
-        </p:txBody>
-      </p:sp>
-      <p:pic>
-        <p:nvPicPr>
-          <p:cNvPr id="20" name="Picture 19">
-            <a:extLst>
-              <a:ext uri="{FF2B5EF4-FFF2-40B4-BE49-F238E27FC236}">
-                <a16:creationId xmlns:a16="http://schemas.microsoft.com/office/drawing/2014/main" id="{88565429-EB07-4F66-BDE1-09B15C53A2D8}"/>
-              </a:ext>
-            </a:extLst>
-          </p:cNvPr>
-          <p:cNvPicPr>
-            <a:picLocks noChangeAspect="1"/>
-          </p:cNvPicPr>
-          <p:nvPr/>
-        </p:nvPicPr>
-        <p:blipFill>
-          <a:blip r:embed="rId2"/>
-          <a:stretch>
-            <a:fillRect/>
-          </a:stretch>
-        </p:blipFill>
-        <p:spPr>
-          <a:xfrm>
-            <a:off x="720314" y="1942091"/>
-            <a:ext cx="7703371" cy="1677360"/>
-          </a:xfrm>
-          <a:prstGeom prst="rect">
-            <a:avLst/>
-          </a:prstGeom>
-        </p:spPr>
-      </p:pic>
-      <p:sp>
-        <p:nvSpPr>
-          <p:cNvPr id="21" name="TextBox 20">
-            <a:extLst>
-              <a:ext uri="{FF2B5EF4-FFF2-40B4-BE49-F238E27FC236}">
-                <a16:creationId xmlns:a16="http://schemas.microsoft.com/office/drawing/2014/main" id="{695B5CF0-A488-4D9B-B04C-E4878A4DF807}"/>
-              </a:ext>
-            </a:extLst>
-          </p:cNvPr>
-          <p:cNvSpPr txBox="1"/>
-          <p:nvPr/>
-        </p:nvSpPr>
-        <p:spPr>
-          <a:xfrm>
-            <a:off x="435315" y="610094"/>
-            <a:ext cx="7698752" cy="461665"/>
-          </a:xfrm>
-          <a:prstGeom prst="rect">
-            <a:avLst/>
-          </a:prstGeom>
-          <a:ln>
-            <a:solidFill>
-              <a:srgbClr val="5F4B8B"/>
-            </a:solidFill>
-          </a:ln>
-        </p:spPr>
-        <p:txBody>
-          <a:bodyPr wrap="square" rtlCol="0">
-            <a:spAutoFit/>
-          </a:bodyPr>
-          <a:lstStyle/>
-          <a:p>
-            <a:r>
-              <a:rPr lang="en-US" sz="2400" u="sng" dirty="0"/>
-              <a:t>Example use</a:t>
-            </a:r>
-            <a:r>
-              <a:rPr lang="en-US" sz="2400" dirty="0"/>
-              <a:t> + info from Directives tab:</a:t>
-            </a:r>
-          </a:p>
-        </p:txBody>
-      </p:sp>
-      <p:grpSp>
-        <p:nvGrpSpPr>
-          <p:cNvPr id="26" name="Group 25">
-            <a:extLst>
-              <a:ext uri="{FF2B5EF4-FFF2-40B4-BE49-F238E27FC236}">
-                <a16:creationId xmlns:a16="http://schemas.microsoft.com/office/drawing/2014/main" id="{E55720E5-2B12-4B05-ACA3-3BB2FB90BB8F}"/>
-              </a:ext>
-            </a:extLst>
-          </p:cNvPr>
-          <p:cNvGrpSpPr/>
-          <p:nvPr/>
-        </p:nvGrpSpPr>
-        <p:grpSpPr>
-          <a:xfrm>
-            <a:off x="1158878" y="1208886"/>
-            <a:ext cx="7445294" cy="905339"/>
-            <a:chOff x="1158878" y="1208886"/>
-            <a:chExt cx="7445294" cy="905339"/>
-          </a:xfrm>
-        </p:grpSpPr>
-        <p:sp>
-          <p:nvSpPr>
-            <p:cNvPr id="22" name="Rectangle 21">
-              <a:extLst>
-                <a:ext uri="{FF2B5EF4-FFF2-40B4-BE49-F238E27FC236}">
-                  <a16:creationId xmlns:a16="http://schemas.microsoft.com/office/drawing/2014/main" id="{A40B63E4-249C-4C32-A3C3-1F1EAE92669E}"/>
-                </a:ext>
-              </a:extLst>
-            </p:cNvPr>
-            <p:cNvSpPr/>
-            <p:nvPr/>
-          </p:nvSpPr>
-          <p:spPr>
-            <a:xfrm>
-              <a:off x="1481767" y="1208886"/>
-              <a:ext cx="7122405" cy="338554"/>
-            </a:xfrm>
-            <a:prstGeom prst="rect">
-              <a:avLst/>
-            </a:prstGeom>
-            <a:ln>
-              <a:noFill/>
-            </a:ln>
-          </p:spPr>
-          <p:txBody>
-            <a:bodyPr wrap="square">
-              <a:spAutoFit/>
-            </a:bodyPr>
-            <a:lstStyle/>
-            <a:p>
-              <a:r>
-                <a:rPr lang="en-US" sz="1600" dirty="0">
-                  <a:solidFill>
-                    <a:srgbClr val="7030A0"/>
-                  </a:solidFill>
-                </a:rPr>
-                <a:t>.data: “Subsequent </a:t>
-              </a:r>
-              <a:r>
-                <a:rPr lang="en-US" sz="1600" dirty="0">
-                  <a:solidFill>
-                    <a:srgbClr val="5F4B8B"/>
-                  </a:solidFill>
-                </a:rPr>
-                <a:t>items</a:t>
-              </a:r>
-              <a:r>
-                <a:rPr lang="en-US" sz="1600" dirty="0">
-                  <a:solidFill>
-                    <a:srgbClr val="7030A0"/>
-                  </a:solidFill>
-                </a:rPr>
-                <a:t> stored in Data segment at next available address” </a:t>
-              </a:r>
-            </a:p>
-          </p:txBody>
-        </p:sp>
-        <p:cxnSp>
-          <p:nvCxnSpPr>
-            <p:cNvPr id="24" name="Straight Arrow Connector 23">
-              <a:extLst>
-                <a:ext uri="{FF2B5EF4-FFF2-40B4-BE49-F238E27FC236}">
-                  <a16:creationId xmlns:a16="http://schemas.microsoft.com/office/drawing/2014/main" id="{D8F9634A-2153-483A-8F51-676BB2D92DC1}"/>
-                </a:ext>
-              </a:extLst>
-            </p:cNvPr>
-            <p:cNvCxnSpPr>
-              <a:cxnSpLocks/>
-            </p:cNvCxnSpPr>
-            <p:nvPr/>
-          </p:nvCxnSpPr>
-          <p:spPr>
-            <a:xfrm flipH="1">
-              <a:off x="1158878" y="1547440"/>
-              <a:ext cx="658905" cy="566785"/>
-            </a:xfrm>
-            <a:prstGeom prst="straightConnector1">
-              <a:avLst/>
-            </a:prstGeom>
-            <a:ln>
-              <a:solidFill>
-                <a:srgbClr val="5F4B8B"/>
-              </a:solidFill>
-              <a:tailEnd type="triangle"/>
-            </a:ln>
-          </p:spPr>
-          <p:style>
-            <a:lnRef idx="1">
-              <a:schemeClr val="accent1"/>
-            </a:lnRef>
-            <a:fillRef idx="0">
-              <a:schemeClr val="accent1"/>
-            </a:fillRef>
-            <a:effectRef idx="0">
-              <a:schemeClr val="accent1"/>
-            </a:effectRef>
-            <a:fontRef idx="minor">
-              <a:schemeClr val="tx1"/>
-            </a:fontRef>
-          </p:style>
-        </p:cxnSp>
-      </p:grpSp>
-      <p:grpSp>
-        <p:nvGrpSpPr>
-          <p:cNvPr id="27" name="Group 26">
-            <a:extLst>
-              <a:ext uri="{FF2B5EF4-FFF2-40B4-BE49-F238E27FC236}">
-                <a16:creationId xmlns:a16="http://schemas.microsoft.com/office/drawing/2014/main" id="{E07C9810-1693-489A-8A67-8E95C51FBE94}"/>
-              </a:ext>
-            </a:extLst>
-          </p:cNvPr>
-          <p:cNvGrpSpPr/>
-          <p:nvPr/>
-        </p:nvGrpSpPr>
-        <p:grpSpPr>
-          <a:xfrm>
-            <a:off x="2458597" y="1580491"/>
-            <a:ext cx="7122405" cy="707763"/>
-            <a:chOff x="1019058" y="1406462"/>
-            <a:chExt cx="7122405" cy="707763"/>
-          </a:xfrm>
-        </p:grpSpPr>
-        <p:sp>
-          <p:nvSpPr>
-            <p:cNvPr id="28" name="Rectangle 27">
-              <a:extLst>
-                <a:ext uri="{FF2B5EF4-FFF2-40B4-BE49-F238E27FC236}">
-                  <a16:creationId xmlns:a16="http://schemas.microsoft.com/office/drawing/2014/main" id="{88E9BA56-54C5-4A48-8000-C74D9F67EE09}"/>
-                </a:ext>
-              </a:extLst>
-            </p:cNvPr>
-            <p:cNvSpPr/>
-            <p:nvPr/>
-          </p:nvSpPr>
-          <p:spPr>
-            <a:xfrm>
-              <a:off x="1019058" y="1406462"/>
-              <a:ext cx="7122405" cy="584775"/>
-            </a:xfrm>
-            <a:prstGeom prst="rect">
-              <a:avLst/>
-            </a:prstGeom>
-            <a:ln>
-              <a:noFill/>
-            </a:ln>
-          </p:spPr>
-          <p:txBody>
-            <a:bodyPr wrap="square">
-              <a:spAutoFit/>
-            </a:bodyPr>
-            <a:lstStyle/>
-            <a:p>
-              <a:r>
-                <a:rPr lang="en-US" sz="1600" dirty="0">
-                  <a:solidFill>
-                    <a:srgbClr val="7030A0"/>
-                  </a:solidFill>
-                </a:rPr>
-                <a:t> .</a:t>
-              </a:r>
-              <a:r>
-                <a:rPr lang="en-US" sz="1600" dirty="0" err="1">
-                  <a:solidFill>
-                    <a:srgbClr val="7030A0"/>
-                  </a:solidFill>
-                </a:rPr>
-                <a:t>asciiz</a:t>
-              </a:r>
-              <a:r>
-                <a:rPr lang="en-US" sz="1600" dirty="0">
-                  <a:solidFill>
-                    <a:srgbClr val="7030A0"/>
-                  </a:solidFill>
-                </a:rPr>
-                <a:t> “Store the string in the Data segment and add null terminator” </a:t>
-              </a:r>
-            </a:p>
-            <a:p>
-              <a:endParaRPr lang="en-US" sz="1600" dirty="0">
-                <a:solidFill>
-                  <a:srgbClr val="7030A0"/>
-                </a:solidFill>
-              </a:endParaRPr>
-            </a:p>
-          </p:txBody>
-        </p:sp>
-        <p:cxnSp>
-          <p:nvCxnSpPr>
-            <p:cNvPr id="29" name="Straight Arrow Connector 28">
-              <a:extLst>
-                <a:ext uri="{FF2B5EF4-FFF2-40B4-BE49-F238E27FC236}">
-                  <a16:creationId xmlns:a16="http://schemas.microsoft.com/office/drawing/2014/main" id="{566EEDF9-3B93-4DB0-BD73-24A5D27EB36C}"/>
-                </a:ext>
-              </a:extLst>
-            </p:cNvPr>
-            <p:cNvCxnSpPr>
-              <a:cxnSpLocks/>
-            </p:cNvCxnSpPr>
-            <p:nvPr/>
-          </p:nvCxnSpPr>
-          <p:spPr>
-            <a:xfrm flipH="1">
-              <a:off x="1158879" y="1754302"/>
-              <a:ext cx="484470" cy="359923"/>
-            </a:xfrm>
-            <a:prstGeom prst="straightConnector1">
-              <a:avLst/>
-            </a:prstGeom>
-            <a:ln>
-              <a:solidFill>
-                <a:srgbClr val="5F4B8B"/>
-              </a:solidFill>
-              <a:tailEnd type="triangle"/>
-            </a:ln>
-          </p:spPr>
-          <p:style>
-            <a:lnRef idx="1">
-              <a:schemeClr val="accent1"/>
-            </a:lnRef>
-            <a:fillRef idx="0">
-              <a:schemeClr val="accent1"/>
-            </a:fillRef>
-            <a:effectRef idx="0">
-              <a:schemeClr val="accent1"/>
-            </a:effectRef>
-            <a:fontRef idx="minor">
-              <a:schemeClr val="tx1"/>
-            </a:fontRef>
-          </p:style>
-        </p:cxnSp>
-      </p:grpSp>
-      <p:pic>
-        <p:nvPicPr>
-          <p:cNvPr id="34" name="Picture 33" descr="C:\Users\Karin\Google Drive\CS\CS447\mars4_5\mars4_5\mips1.asm  - MARS 4.5">
-            <a:extLst>
-              <a:ext uri="{FF2B5EF4-FFF2-40B4-BE49-F238E27FC236}">
-                <a16:creationId xmlns:a16="http://schemas.microsoft.com/office/drawing/2014/main" id="{9EF567E6-F5D8-4ABC-962B-413E7A213475}"/>
-              </a:ext>
-            </a:extLst>
-          </p:cNvPr>
-          <p:cNvPicPr>
-            <a:picLocks noChangeAspect="1"/>
-          </p:cNvPicPr>
-          <p:nvPr/>
-        </p:nvPicPr>
-        <p:blipFill rotWithShape="1">
-          <a:blip r:embed="rId3">
-            <a:extLst>
-              <a:ext uri="{28A0092B-C50C-407E-A947-70E740481C1C}">
-                <a14:useLocalDpi xmlns:a14="http://schemas.microsoft.com/office/drawing/2010/main" val="0"/>
-              </a:ext>
-            </a:extLst>
-          </a:blip>
-          <a:srcRect l="432" t="44545" r="26556" b="21616"/>
-          <a:stretch/>
-        </p:blipFill>
-        <p:spPr>
-          <a:xfrm>
-            <a:off x="597574" y="3633211"/>
-            <a:ext cx="7772400" cy="1952771"/>
-          </a:xfrm>
-          <a:prstGeom prst="rect">
-            <a:avLst/>
-          </a:prstGeom>
-        </p:spPr>
-      </p:pic>
-      <p:sp>
-        <p:nvSpPr>
-          <p:cNvPr id="35" name="Rectangle 34">
-            <a:extLst>
-              <a:ext uri="{FF2B5EF4-FFF2-40B4-BE49-F238E27FC236}">
-                <a16:creationId xmlns:a16="http://schemas.microsoft.com/office/drawing/2014/main" id="{790E8053-5511-4E9E-9780-97C6A3C931FE}"/>
-              </a:ext>
-            </a:extLst>
-          </p:cNvPr>
-          <p:cNvSpPr/>
-          <p:nvPr/>
-        </p:nvSpPr>
-        <p:spPr>
-          <a:xfrm>
-            <a:off x="1488330" y="4092677"/>
-            <a:ext cx="3341767" cy="147484"/>
-          </a:xfrm>
-          <a:prstGeom prst="rect">
-            <a:avLst/>
-          </a:prstGeom>
-          <a:noFill/>
-          <a:ln w="38100">
-            <a:solidFill>
-              <a:srgbClr val="0CE811"/>
-            </a:solidFill>
-          </a:ln>
-        </p:spPr>
-        <p:style>
-          <a:lnRef idx="2">
-            <a:schemeClr val="accent1">
-              <a:shade val="50000"/>
-            </a:schemeClr>
-          </a:lnRef>
-          <a:fillRef idx="1">
-            <a:schemeClr val="accent1"/>
-          </a:fillRef>
-          <a:effectRef idx="0">
-            <a:schemeClr val="accent1"/>
-          </a:effectRef>
-          <a:fontRef idx="minor">
-            <a:schemeClr val="lt1"/>
-          </a:fontRef>
-        </p:style>
-        <p:txBody>
-          <a:bodyPr rtlCol="0" anchor="ctr"/>
-          <a:lstStyle/>
-          <a:p>
-            <a:pPr algn="ctr"/>
-            <a:endParaRPr lang="en-US"/>
-          </a:p>
-        </p:txBody>
-      </p:sp>
-    </p:spTree>
-    <p:extLst>
-      <p:ext uri="{BB962C8B-B14F-4D97-AF65-F5344CB8AC3E}">
-        <p14:creationId xmlns:p14="http://schemas.microsoft.com/office/powerpoint/2010/main" val="3113507914"/>
-      </p:ext>
-    </p:extLst>
-  </p:cSld>
-  <p:clrMapOvr>
-    <a:masterClrMapping/>
-  </p:clrMapOvr>
-</p:sld>
-</file>
-
-<file path=ppt/slides/slide6.xml><?xml version="1.0" encoding="utf-8"?>
-<p:sld xmlns:a="http://schemas.openxmlformats.org/drawingml/2006/main" xmlns:r="http://schemas.openxmlformats.org/officeDocument/2006/relationships" xmlns:p="http://schemas.openxmlformats.org/presentationml/2006/main">
-  <p:cSld>
-    <p:spTree>
-      <p:nvGrpSpPr>
-        <p:cNvPr id="1" name=""/>
-        <p:cNvGrpSpPr/>
-        <p:nvPr/>
-      </p:nvGrpSpPr>
-      <p:grpSpPr>
-        <a:xfrm>
-          <a:off x="0" y="0"/>
-          <a:ext cx="0" cy="0"/>
-          <a:chOff x="0" y="0"/>
-          <a:chExt cx="0" cy="0"/>
-        </a:xfrm>
-      </p:grpSpPr>
-      <p:sp>
-        <p:nvSpPr>
-          <p:cNvPr id="5" name="TextBox 4"/>
-          <p:cNvSpPr txBox="1"/>
-          <p:nvPr/>
-        </p:nvSpPr>
-        <p:spPr>
-          <a:xfrm>
-            <a:off x="0" y="0"/>
-            <a:ext cx="8134066" cy="523220"/>
-          </a:xfrm>
-          <a:prstGeom prst="rect">
-            <a:avLst/>
-          </a:prstGeom>
-        </p:spPr>
-        <p:txBody>
-          <a:bodyPr rtlCol="0">
-            <a:spAutoFit/>
-          </a:bodyPr>
-          <a:lstStyle/>
-          <a:p>
-            <a:r>
-              <a:rPr lang="en-US" sz="2800" dirty="0">
-                <a:solidFill>
-                  <a:srgbClr val="002060"/>
-                </a:solidFill>
-              </a:rPr>
-              <a:t>Lab #2: </a:t>
-            </a:r>
-            <a:r>
-              <a:rPr lang="en-US" sz="2800" dirty="0" err="1">
-                <a:solidFill>
-                  <a:srgbClr val="002060"/>
-                </a:solidFill>
-              </a:rPr>
               <a:t>Syscalls</a:t>
             </a:r>
             <a:endParaRPr lang="en-US" sz="2800" dirty="0">
@@ -8019,6 +7530,495 @@
       <p:bldP spid="19" grpId="0"/>
     </p:bldLst>
   </p:timing>
+</p:sld>
+</file>
+
+<file path=ppt/slides/slide6.xml><?xml version="1.0" encoding="utf-8"?>
+<p:sld xmlns:a="http://schemas.openxmlformats.org/drawingml/2006/main" xmlns:r="http://schemas.openxmlformats.org/officeDocument/2006/relationships" xmlns:p="http://schemas.openxmlformats.org/presentationml/2006/main">
+  <p:cSld>
+    <p:spTree>
+      <p:nvGrpSpPr>
+        <p:cNvPr id="1" name=""/>
+        <p:cNvGrpSpPr/>
+        <p:nvPr/>
+      </p:nvGrpSpPr>
+      <p:grpSpPr>
+        <a:xfrm>
+          <a:off x="0" y="0"/>
+          <a:ext cx="0" cy="0"/>
+          <a:chOff x="0" y="0"/>
+          <a:chExt cx="0" cy="0"/>
+        </a:xfrm>
+      </p:grpSpPr>
+      <p:sp>
+        <p:nvSpPr>
+          <p:cNvPr id="5" name="TextBox 4"/>
+          <p:cNvSpPr txBox="1"/>
+          <p:nvPr/>
+        </p:nvSpPr>
+        <p:spPr>
+          <a:xfrm>
+            <a:off x="0" y="0"/>
+            <a:ext cx="8134066" cy="523220"/>
+          </a:xfrm>
+          <a:prstGeom prst="rect">
+            <a:avLst/>
+          </a:prstGeom>
+        </p:spPr>
+        <p:txBody>
+          <a:bodyPr rtlCol="0">
+            <a:spAutoFit/>
+          </a:bodyPr>
+          <a:lstStyle/>
+          <a:p>
+            <a:r>
+              <a:rPr lang="en-US" sz="2800" dirty="0">
+                <a:solidFill>
+                  <a:srgbClr val="002060"/>
+                </a:solidFill>
+              </a:rPr>
+              <a:t>Lab #2: </a:t>
+            </a:r>
+            <a:r>
+              <a:rPr lang="en-US" sz="2800" dirty="0" err="1">
+                <a:solidFill>
+                  <a:srgbClr val="002060"/>
+                </a:solidFill>
+              </a:rPr>
+              <a:t>Syscall</a:t>
+            </a:r>
+            <a:r>
+              <a:rPr lang="en-US" sz="2800" dirty="0">
+                <a:solidFill>
+                  <a:srgbClr val="002060"/>
+                </a:solidFill>
+              </a:rPr>
+              <a:t> #4 (print string)</a:t>
+            </a:r>
+          </a:p>
+        </p:txBody>
+      </p:sp>
+      <p:pic>
+        <p:nvPicPr>
+          <p:cNvPr id="20" name="Picture 19">
+            <a:extLst>
+              <a:ext uri="{FF2B5EF4-FFF2-40B4-BE49-F238E27FC236}">
+                <a16:creationId xmlns:a16="http://schemas.microsoft.com/office/drawing/2014/main" id="{88565429-EB07-4F66-BDE1-09B15C53A2D8}"/>
+              </a:ext>
+            </a:extLst>
+          </p:cNvPr>
+          <p:cNvPicPr>
+            <a:picLocks noChangeAspect="1"/>
+          </p:cNvPicPr>
+          <p:nvPr/>
+        </p:nvPicPr>
+        <p:blipFill>
+          <a:blip r:embed="rId2"/>
+          <a:stretch>
+            <a:fillRect/>
+          </a:stretch>
+        </p:blipFill>
+        <p:spPr>
+          <a:xfrm>
+            <a:off x="720314" y="1942091"/>
+            <a:ext cx="7703371" cy="1677360"/>
+          </a:xfrm>
+          <a:prstGeom prst="rect">
+            <a:avLst/>
+          </a:prstGeom>
+        </p:spPr>
+      </p:pic>
+      <p:sp>
+        <p:nvSpPr>
+          <p:cNvPr id="21" name="TextBox 20">
+            <a:extLst>
+              <a:ext uri="{FF2B5EF4-FFF2-40B4-BE49-F238E27FC236}">
+                <a16:creationId xmlns:a16="http://schemas.microsoft.com/office/drawing/2014/main" id="{695B5CF0-A488-4D9B-B04C-E4878A4DF807}"/>
+              </a:ext>
+            </a:extLst>
+          </p:cNvPr>
+          <p:cNvSpPr txBox="1"/>
+          <p:nvPr/>
+        </p:nvSpPr>
+        <p:spPr>
+          <a:xfrm>
+            <a:off x="435315" y="610094"/>
+            <a:ext cx="7698752" cy="461665"/>
+          </a:xfrm>
+          <a:prstGeom prst="rect">
+            <a:avLst/>
+          </a:prstGeom>
+          <a:ln>
+            <a:solidFill>
+              <a:srgbClr val="5F4B8B"/>
+            </a:solidFill>
+          </a:ln>
+        </p:spPr>
+        <p:txBody>
+          <a:bodyPr wrap="square" rtlCol="0">
+            <a:spAutoFit/>
+          </a:bodyPr>
+          <a:lstStyle/>
+          <a:p>
+            <a:r>
+              <a:rPr lang="en-US" sz="2400" u="sng" dirty="0"/>
+              <a:t>Example use</a:t>
+            </a:r>
+            <a:r>
+              <a:rPr lang="en-US" sz="2400" dirty="0"/>
+              <a:t> + info from Directives tab:</a:t>
+            </a:r>
+          </a:p>
+        </p:txBody>
+      </p:sp>
+      <p:grpSp>
+        <p:nvGrpSpPr>
+          <p:cNvPr id="26" name="Group 25">
+            <a:extLst>
+              <a:ext uri="{FF2B5EF4-FFF2-40B4-BE49-F238E27FC236}">
+                <a16:creationId xmlns:a16="http://schemas.microsoft.com/office/drawing/2014/main" id="{E55720E5-2B12-4B05-ACA3-3BB2FB90BB8F}"/>
+              </a:ext>
+            </a:extLst>
+          </p:cNvPr>
+          <p:cNvGrpSpPr/>
+          <p:nvPr/>
+        </p:nvGrpSpPr>
+        <p:grpSpPr>
+          <a:xfrm>
+            <a:off x="1158878" y="1208886"/>
+            <a:ext cx="7445294" cy="905339"/>
+            <a:chOff x="1158878" y="1208886"/>
+            <a:chExt cx="7445294" cy="905339"/>
+          </a:xfrm>
+        </p:grpSpPr>
+        <p:sp>
+          <p:nvSpPr>
+            <p:cNvPr id="22" name="Rectangle 21">
+              <a:extLst>
+                <a:ext uri="{FF2B5EF4-FFF2-40B4-BE49-F238E27FC236}">
+                  <a16:creationId xmlns:a16="http://schemas.microsoft.com/office/drawing/2014/main" id="{A40B63E4-249C-4C32-A3C3-1F1EAE92669E}"/>
+                </a:ext>
+              </a:extLst>
+            </p:cNvPr>
+            <p:cNvSpPr/>
+            <p:nvPr/>
+          </p:nvSpPr>
+          <p:spPr>
+            <a:xfrm>
+              <a:off x="1481767" y="1208886"/>
+              <a:ext cx="7122405" cy="338554"/>
+            </a:xfrm>
+            <a:prstGeom prst="rect">
+              <a:avLst/>
+            </a:prstGeom>
+            <a:ln>
+              <a:noFill/>
+            </a:ln>
+          </p:spPr>
+          <p:txBody>
+            <a:bodyPr wrap="square">
+              <a:spAutoFit/>
+            </a:bodyPr>
+            <a:lstStyle/>
+            <a:p>
+              <a:r>
+                <a:rPr lang="en-US" sz="1600" dirty="0">
+                  <a:solidFill>
+                    <a:srgbClr val="7030A0"/>
+                  </a:solidFill>
+                </a:rPr>
+                <a:t>.data: “Subsequent </a:t>
+              </a:r>
+              <a:r>
+                <a:rPr lang="en-US" sz="1600" dirty="0">
+                  <a:solidFill>
+                    <a:srgbClr val="5F4B8B"/>
+                  </a:solidFill>
+                </a:rPr>
+                <a:t>items</a:t>
+              </a:r>
+              <a:r>
+                <a:rPr lang="en-US" sz="1600" dirty="0">
+                  <a:solidFill>
+                    <a:srgbClr val="7030A0"/>
+                  </a:solidFill>
+                </a:rPr>
+                <a:t> stored in Data segment at next available address” </a:t>
+              </a:r>
+            </a:p>
+          </p:txBody>
+        </p:sp>
+        <p:cxnSp>
+          <p:nvCxnSpPr>
+            <p:cNvPr id="24" name="Straight Arrow Connector 23">
+              <a:extLst>
+                <a:ext uri="{FF2B5EF4-FFF2-40B4-BE49-F238E27FC236}">
+                  <a16:creationId xmlns:a16="http://schemas.microsoft.com/office/drawing/2014/main" id="{D8F9634A-2153-483A-8F51-676BB2D92DC1}"/>
+                </a:ext>
+              </a:extLst>
+            </p:cNvPr>
+            <p:cNvCxnSpPr>
+              <a:cxnSpLocks/>
+            </p:cNvCxnSpPr>
+            <p:nvPr/>
+          </p:nvCxnSpPr>
+          <p:spPr>
+            <a:xfrm flipH="1">
+              <a:off x="1158878" y="1547440"/>
+              <a:ext cx="658905" cy="566785"/>
+            </a:xfrm>
+            <a:prstGeom prst="straightConnector1">
+              <a:avLst/>
+            </a:prstGeom>
+            <a:ln>
+              <a:solidFill>
+                <a:srgbClr val="5F4B8B"/>
+              </a:solidFill>
+              <a:tailEnd type="triangle"/>
+            </a:ln>
+          </p:spPr>
+          <p:style>
+            <a:lnRef idx="1">
+              <a:schemeClr val="accent1"/>
+            </a:lnRef>
+            <a:fillRef idx="0">
+              <a:schemeClr val="accent1"/>
+            </a:fillRef>
+            <a:effectRef idx="0">
+              <a:schemeClr val="accent1"/>
+            </a:effectRef>
+            <a:fontRef idx="minor">
+              <a:schemeClr val="tx1"/>
+            </a:fontRef>
+          </p:style>
+        </p:cxnSp>
+      </p:grpSp>
+      <p:grpSp>
+        <p:nvGrpSpPr>
+          <p:cNvPr id="27" name="Group 26">
+            <a:extLst>
+              <a:ext uri="{FF2B5EF4-FFF2-40B4-BE49-F238E27FC236}">
+                <a16:creationId xmlns:a16="http://schemas.microsoft.com/office/drawing/2014/main" id="{E07C9810-1693-489A-8A67-8E95C51FBE94}"/>
+              </a:ext>
+            </a:extLst>
+          </p:cNvPr>
+          <p:cNvGrpSpPr/>
+          <p:nvPr/>
+        </p:nvGrpSpPr>
+        <p:grpSpPr>
+          <a:xfrm>
+            <a:off x="2458597" y="1580491"/>
+            <a:ext cx="7122405" cy="707763"/>
+            <a:chOff x="1019058" y="1406462"/>
+            <a:chExt cx="7122405" cy="707763"/>
+          </a:xfrm>
+        </p:grpSpPr>
+        <p:sp>
+          <p:nvSpPr>
+            <p:cNvPr id="28" name="Rectangle 27">
+              <a:extLst>
+                <a:ext uri="{FF2B5EF4-FFF2-40B4-BE49-F238E27FC236}">
+                  <a16:creationId xmlns:a16="http://schemas.microsoft.com/office/drawing/2014/main" id="{88E9BA56-54C5-4A48-8000-C74D9F67EE09}"/>
+                </a:ext>
+              </a:extLst>
+            </p:cNvPr>
+            <p:cNvSpPr/>
+            <p:nvPr/>
+          </p:nvSpPr>
+          <p:spPr>
+            <a:xfrm>
+              <a:off x="1019058" y="1406462"/>
+              <a:ext cx="7122405" cy="584775"/>
+            </a:xfrm>
+            <a:prstGeom prst="rect">
+              <a:avLst/>
+            </a:prstGeom>
+            <a:ln>
+              <a:noFill/>
+            </a:ln>
+          </p:spPr>
+          <p:txBody>
+            <a:bodyPr wrap="square">
+              <a:spAutoFit/>
+            </a:bodyPr>
+            <a:lstStyle/>
+            <a:p>
+              <a:r>
+                <a:rPr lang="en-US" sz="1600" dirty="0">
+                  <a:solidFill>
+                    <a:srgbClr val="7030A0"/>
+                  </a:solidFill>
+                </a:rPr>
+                <a:t> .</a:t>
+              </a:r>
+              <a:r>
+                <a:rPr lang="en-US" sz="1600" dirty="0" err="1">
+                  <a:solidFill>
+                    <a:srgbClr val="7030A0"/>
+                  </a:solidFill>
+                </a:rPr>
+                <a:t>asciiz</a:t>
+              </a:r>
+              <a:r>
+                <a:rPr lang="en-US" sz="1600" dirty="0">
+                  <a:solidFill>
+                    <a:srgbClr val="7030A0"/>
+                  </a:solidFill>
+                </a:rPr>
+                <a:t> “Store the string in the Data segment and add null terminator” </a:t>
+              </a:r>
+            </a:p>
+            <a:p>
+              <a:endParaRPr lang="en-US" sz="1600" dirty="0">
+                <a:solidFill>
+                  <a:srgbClr val="7030A0"/>
+                </a:solidFill>
+              </a:endParaRPr>
+            </a:p>
+          </p:txBody>
+        </p:sp>
+        <p:cxnSp>
+          <p:nvCxnSpPr>
+            <p:cNvPr id="29" name="Straight Arrow Connector 28">
+              <a:extLst>
+                <a:ext uri="{FF2B5EF4-FFF2-40B4-BE49-F238E27FC236}">
+                  <a16:creationId xmlns:a16="http://schemas.microsoft.com/office/drawing/2014/main" id="{566EEDF9-3B93-4DB0-BD73-24A5D27EB36C}"/>
+                </a:ext>
+              </a:extLst>
+            </p:cNvPr>
+            <p:cNvCxnSpPr>
+              <a:cxnSpLocks/>
+            </p:cNvCxnSpPr>
+            <p:nvPr/>
+          </p:nvCxnSpPr>
+          <p:spPr>
+            <a:xfrm flipH="1">
+              <a:off x="1158879" y="1754302"/>
+              <a:ext cx="484470" cy="359923"/>
+            </a:xfrm>
+            <a:prstGeom prst="straightConnector1">
+              <a:avLst/>
+            </a:prstGeom>
+            <a:ln>
+              <a:solidFill>
+                <a:srgbClr val="5F4B8B"/>
+              </a:solidFill>
+              <a:tailEnd type="triangle"/>
+            </a:ln>
+          </p:spPr>
+          <p:style>
+            <a:lnRef idx="1">
+              <a:schemeClr val="accent1"/>
+            </a:lnRef>
+            <a:fillRef idx="0">
+              <a:schemeClr val="accent1"/>
+            </a:fillRef>
+            <a:effectRef idx="0">
+              <a:schemeClr val="accent1"/>
+            </a:effectRef>
+            <a:fontRef idx="minor">
+              <a:schemeClr val="tx1"/>
+            </a:fontRef>
+          </p:style>
+        </p:cxnSp>
+      </p:grpSp>
+      <p:pic>
+        <p:nvPicPr>
+          <p:cNvPr id="34" name="Picture 33" descr="C:\Users\Karin\Google Drive\CS\CS447\mars4_5\mars4_5\mips1.asm  - MARS 4.5">
+            <a:extLst>
+              <a:ext uri="{FF2B5EF4-FFF2-40B4-BE49-F238E27FC236}">
+                <a16:creationId xmlns:a16="http://schemas.microsoft.com/office/drawing/2014/main" id="{9EF567E6-F5D8-4ABC-962B-413E7A213475}"/>
+              </a:ext>
+            </a:extLst>
+          </p:cNvPr>
+          <p:cNvPicPr>
+            <a:picLocks noChangeAspect="1"/>
+          </p:cNvPicPr>
+          <p:nvPr/>
+        </p:nvPicPr>
+        <p:blipFill rotWithShape="1">
+          <a:blip r:embed="rId3">
+            <a:extLst>
+              <a:ext uri="{28A0092B-C50C-407E-A947-70E740481C1C}">
+                <a14:useLocalDpi xmlns:a14="http://schemas.microsoft.com/office/drawing/2010/main" val="0"/>
+              </a:ext>
+            </a:extLst>
+          </a:blip>
+          <a:srcRect l="432" t="44545" r="26556" b="21616"/>
+          <a:stretch/>
+        </p:blipFill>
+        <p:spPr>
+          <a:xfrm>
+            <a:off x="597574" y="3633211"/>
+            <a:ext cx="7772400" cy="1952771"/>
+          </a:xfrm>
+          <a:prstGeom prst="rect">
+            <a:avLst/>
+          </a:prstGeom>
+        </p:spPr>
+      </p:pic>
+      <p:sp>
+        <p:nvSpPr>
+          <p:cNvPr id="35" name="Rectangle 34">
+            <a:extLst>
+              <a:ext uri="{FF2B5EF4-FFF2-40B4-BE49-F238E27FC236}">
+                <a16:creationId xmlns:a16="http://schemas.microsoft.com/office/drawing/2014/main" id="{790E8053-5511-4E9E-9780-97C6A3C931FE}"/>
+              </a:ext>
+            </a:extLst>
+          </p:cNvPr>
+          <p:cNvSpPr/>
+          <p:nvPr/>
+        </p:nvSpPr>
+        <p:spPr>
+          <a:xfrm>
+            <a:off x="1488330" y="4092677"/>
+            <a:ext cx="3341767" cy="147484"/>
+          </a:xfrm>
+          <a:prstGeom prst="rect">
+            <a:avLst/>
+          </a:prstGeom>
+          <a:noFill/>
+          <a:ln w="38100">
+            <a:solidFill>
+              <a:srgbClr val="0CE811"/>
+            </a:solidFill>
+          </a:ln>
+        </p:spPr>
+        <p:style>
+          <a:lnRef idx="2">
+            <a:schemeClr val="accent1">
+              <a:shade val="50000"/>
+            </a:schemeClr>
+          </a:lnRef>
+          <a:fillRef idx="1">
+            <a:schemeClr val="accent1"/>
+          </a:fillRef>
+          <a:effectRef idx="0">
+            <a:schemeClr val="accent1"/>
+          </a:effectRef>
+          <a:fontRef idx="minor">
+            <a:schemeClr val="lt1"/>
+          </a:fontRef>
+        </p:style>
+        <p:txBody>
+          <a:bodyPr rtlCol="0" anchor="ctr"/>
+          <a:lstStyle/>
+          <a:p>
+            <a:pPr algn="ctr"/>
+            <a:endParaRPr lang="en-US"/>
+          </a:p>
+        </p:txBody>
+      </p:sp>
+    </p:spTree>
+    <p:extLst>
+      <p:ext uri="{BB962C8B-B14F-4D97-AF65-F5344CB8AC3E}">
+        <p14:creationId xmlns:p14="http://schemas.microsoft.com/office/powerpoint/2010/main" val="3113507914"/>
+      </p:ext>
+    </p:extLst>
+  </p:cSld>
+  <p:clrMapOvr>
+    <a:masterClrMapping/>
+  </p:clrMapOvr>
 </p:sld>
 </file>
 

</xml_diff>